<commit_message>
ANOVA done and new diagrams
</commit_message>
<xml_diff>
--- a/Diagrams/NormalProbPlotYearsCode.pptx
+++ b/Diagrams/NormalProbPlotYearsCode.pptx
@@ -104,6 +104,11 @@
       </a:defRPr>
     </a:lvl9pPr>
   </p:defaultTextStyle>
+  <p:extLst>
+    <p:ext uri="{EFAFB233-063F-42B5-8137-9DF3F51BA10A}">
+      <p15:sldGuideLst xmlns:p15="http://schemas.microsoft.com/office/powerpoint/2012/main"/>
+    </p:ext>
+  </p:extLst>
 </p:presentation>
 </file>
 
@@ -254,7 +259,7 @@
           <a:p>
             <a:fld id="{C0DF1FFC-3595-41AB-ACD4-47AEB03EC2AE}" type="datetimeFigureOut">
               <a:rPr lang="en-US" smtClean="0"/>
-              <a:t>3/22/2023</a:t>
+              <a:t>3/26/2023</a:t>
             </a:fld>
             <a:endParaRPr lang="en-US"/>
           </a:p>
@@ -308,7 +313,7 @@
           <a:p>
             <a:fld id="{CB914369-FE8E-443F-BF0F-904598BFF7B2}" type="slidenum">
               <a:rPr lang="en-US" smtClean="0"/>
-              <a:t>‹#›</a:t>
+              <a:t>‹Nº›</a:t>
             </a:fld>
             <a:endParaRPr lang="en-US"/>
           </a:p>
@@ -452,7 +457,7 @@
           <a:p>
             <a:fld id="{C0DF1FFC-3595-41AB-ACD4-47AEB03EC2AE}" type="datetimeFigureOut">
               <a:rPr lang="en-US" smtClean="0"/>
-              <a:t>3/22/2023</a:t>
+              <a:t>3/26/2023</a:t>
             </a:fld>
             <a:endParaRPr lang="en-US"/>
           </a:p>
@@ -506,7 +511,7 @@
           <a:p>
             <a:fld id="{CB914369-FE8E-443F-BF0F-904598BFF7B2}" type="slidenum">
               <a:rPr lang="en-US" smtClean="0"/>
-              <a:t>‹#›</a:t>
+              <a:t>‹Nº›</a:t>
             </a:fld>
             <a:endParaRPr lang="en-US"/>
           </a:p>
@@ -660,7 +665,7 @@
           <a:p>
             <a:fld id="{C0DF1FFC-3595-41AB-ACD4-47AEB03EC2AE}" type="datetimeFigureOut">
               <a:rPr lang="en-US" smtClean="0"/>
-              <a:t>3/22/2023</a:t>
+              <a:t>3/26/2023</a:t>
             </a:fld>
             <a:endParaRPr lang="en-US"/>
           </a:p>
@@ -714,7 +719,7 @@
           <a:p>
             <a:fld id="{CB914369-FE8E-443F-BF0F-904598BFF7B2}" type="slidenum">
               <a:rPr lang="en-US" smtClean="0"/>
-              <a:t>‹#›</a:t>
+              <a:t>‹Nº›</a:t>
             </a:fld>
             <a:endParaRPr lang="en-US"/>
           </a:p>
@@ -858,7 +863,7 @@
           <a:p>
             <a:fld id="{C0DF1FFC-3595-41AB-ACD4-47AEB03EC2AE}" type="datetimeFigureOut">
               <a:rPr lang="en-US" smtClean="0"/>
-              <a:t>3/22/2023</a:t>
+              <a:t>3/26/2023</a:t>
             </a:fld>
             <a:endParaRPr lang="en-US"/>
           </a:p>
@@ -912,7 +917,7 @@
           <a:p>
             <a:fld id="{CB914369-FE8E-443F-BF0F-904598BFF7B2}" type="slidenum">
               <a:rPr lang="en-US" smtClean="0"/>
-              <a:t>‹#›</a:t>
+              <a:t>‹Nº›</a:t>
             </a:fld>
             <a:endParaRPr lang="en-US"/>
           </a:p>
@@ -1133,7 +1138,7 @@
           <a:p>
             <a:fld id="{C0DF1FFC-3595-41AB-ACD4-47AEB03EC2AE}" type="datetimeFigureOut">
               <a:rPr lang="en-US" smtClean="0"/>
-              <a:t>3/22/2023</a:t>
+              <a:t>3/26/2023</a:t>
             </a:fld>
             <a:endParaRPr lang="en-US"/>
           </a:p>
@@ -1187,7 +1192,7 @@
           <a:p>
             <a:fld id="{CB914369-FE8E-443F-BF0F-904598BFF7B2}" type="slidenum">
               <a:rPr lang="en-US" smtClean="0"/>
-              <a:t>‹#›</a:t>
+              <a:t>‹Nº›</a:t>
             </a:fld>
             <a:endParaRPr lang="en-US"/>
           </a:p>
@@ -1398,7 +1403,7 @@
           <a:p>
             <a:fld id="{C0DF1FFC-3595-41AB-ACD4-47AEB03EC2AE}" type="datetimeFigureOut">
               <a:rPr lang="en-US" smtClean="0"/>
-              <a:t>3/22/2023</a:t>
+              <a:t>3/26/2023</a:t>
             </a:fld>
             <a:endParaRPr lang="en-US"/>
           </a:p>
@@ -1452,7 +1457,7 @@
           <a:p>
             <a:fld id="{CB914369-FE8E-443F-BF0F-904598BFF7B2}" type="slidenum">
               <a:rPr lang="en-US" smtClean="0"/>
-              <a:t>‹#›</a:t>
+              <a:t>‹Nº›</a:t>
             </a:fld>
             <a:endParaRPr lang="en-US"/>
           </a:p>
@@ -1810,7 +1815,7 @@
           <a:p>
             <a:fld id="{C0DF1FFC-3595-41AB-ACD4-47AEB03EC2AE}" type="datetimeFigureOut">
               <a:rPr lang="en-US" smtClean="0"/>
-              <a:t>3/22/2023</a:t>
+              <a:t>3/26/2023</a:t>
             </a:fld>
             <a:endParaRPr lang="en-US"/>
           </a:p>
@@ -1864,7 +1869,7 @@
           <a:p>
             <a:fld id="{CB914369-FE8E-443F-BF0F-904598BFF7B2}" type="slidenum">
               <a:rPr lang="en-US" smtClean="0"/>
-              <a:t>‹#›</a:t>
+              <a:t>‹Nº›</a:t>
             </a:fld>
             <a:endParaRPr lang="en-US"/>
           </a:p>
@@ -1951,7 +1956,7 @@
           <a:p>
             <a:fld id="{C0DF1FFC-3595-41AB-ACD4-47AEB03EC2AE}" type="datetimeFigureOut">
               <a:rPr lang="en-US" smtClean="0"/>
-              <a:t>3/22/2023</a:t>
+              <a:t>3/26/2023</a:t>
             </a:fld>
             <a:endParaRPr lang="en-US"/>
           </a:p>
@@ -2005,7 +2010,7 @@
           <a:p>
             <a:fld id="{CB914369-FE8E-443F-BF0F-904598BFF7B2}" type="slidenum">
               <a:rPr lang="en-US" smtClean="0"/>
-              <a:t>‹#›</a:t>
+              <a:t>‹Nº›</a:t>
             </a:fld>
             <a:endParaRPr lang="en-US"/>
           </a:p>
@@ -2064,7 +2069,7 @@
           <a:p>
             <a:fld id="{C0DF1FFC-3595-41AB-ACD4-47AEB03EC2AE}" type="datetimeFigureOut">
               <a:rPr lang="en-US" smtClean="0"/>
-              <a:t>3/22/2023</a:t>
+              <a:t>3/26/2023</a:t>
             </a:fld>
             <a:endParaRPr lang="en-US"/>
           </a:p>
@@ -2118,7 +2123,7 @@
           <a:p>
             <a:fld id="{CB914369-FE8E-443F-BF0F-904598BFF7B2}" type="slidenum">
               <a:rPr lang="en-US" smtClean="0"/>
-              <a:t>‹#›</a:t>
+              <a:t>‹Nº›</a:t>
             </a:fld>
             <a:endParaRPr lang="en-US"/>
           </a:p>
@@ -2375,7 +2380,7 @@
           <a:p>
             <a:fld id="{C0DF1FFC-3595-41AB-ACD4-47AEB03EC2AE}" type="datetimeFigureOut">
               <a:rPr lang="en-US" smtClean="0"/>
-              <a:t>3/22/2023</a:t>
+              <a:t>3/26/2023</a:t>
             </a:fld>
             <a:endParaRPr lang="en-US"/>
           </a:p>
@@ -2429,7 +2434,7 @@
           <a:p>
             <a:fld id="{CB914369-FE8E-443F-BF0F-904598BFF7B2}" type="slidenum">
               <a:rPr lang="en-US" smtClean="0"/>
-              <a:t>‹#›</a:t>
+              <a:t>‹Nº›</a:t>
             </a:fld>
             <a:endParaRPr lang="en-US"/>
           </a:p>
@@ -2663,7 +2668,7 @@
           <a:p>
             <a:fld id="{C0DF1FFC-3595-41AB-ACD4-47AEB03EC2AE}" type="datetimeFigureOut">
               <a:rPr lang="en-US" smtClean="0"/>
-              <a:t>3/22/2023</a:t>
+              <a:t>3/26/2023</a:t>
             </a:fld>
             <a:endParaRPr lang="en-US"/>
           </a:p>
@@ -2717,7 +2722,7 @@
           <a:p>
             <a:fld id="{CB914369-FE8E-443F-BF0F-904598BFF7B2}" type="slidenum">
               <a:rPr lang="en-US" smtClean="0"/>
-              <a:t>‹#›</a:t>
+              <a:t>‹Nº›</a:t>
             </a:fld>
             <a:endParaRPr lang="en-US"/>
           </a:p>
@@ -2904,7 +2909,7 @@
           <a:p>
             <a:fld id="{C0DF1FFC-3595-41AB-ACD4-47AEB03EC2AE}" type="datetimeFigureOut">
               <a:rPr lang="en-US" smtClean="0"/>
-              <a:t>3/22/2023</a:t>
+              <a:t>3/26/2023</a:t>
             </a:fld>
             <a:endParaRPr lang="en-US"/>
           </a:p>
@@ -2994,7 +2999,7 @@
           <a:p>
             <a:fld id="{CB914369-FE8E-443F-BF0F-904598BFF7B2}" type="slidenum">
               <a:rPr lang="en-US" smtClean="0"/>
-              <a:t>‹#›</a:t>
+              <a:t>‹Nº›</a:t>
             </a:fld>
             <a:endParaRPr lang="en-US"/>
           </a:p>
@@ -49304,7 +49309,7 @@
           <p:spPr bwMode="auto">
             <a:xfrm>
               <a:off x="5411" y="1229"/>
-              <a:ext cx="666" cy="126"/>
+              <a:ext cx="660" cy="126"/>
             </a:xfrm>
             <a:prstGeom prst="rect">
               <a:avLst/>
@@ -49486,12 +49491,12 @@
                 <a:tabLst/>
               </a:pPr>
               <a:r>
-                <a:rPr lang="en-US" altLang="en-US" sz="1300" b="1" dirty="0">
+                <a:rPr lang="en-US" altLang="en-US" sz="1300" b="1" dirty="0" smtClean="0">
                   <a:solidFill>
                     <a:srgbClr val="000000"/>
                   </a:solidFill>
                 </a:rPr>
-                <a:t>SCC</a:t>
+                <a:t>SSC</a:t>
               </a:r>
               <a:r>
                 <a:rPr kumimoji="0" lang="en-US" altLang="en-US" sz="1300" b="1" i="0" u="none" strike="noStrike" cap="none" normalizeH="0" baseline="0" dirty="0">

</xml_diff>